<commit_message>
Added more epic stuff
</commit_message>
<xml_diff>
--- a/external/pokemon_munchkin_rules.pptx
+++ b/external/pokemon_munchkin_rules.pptx
@@ -3418,8 +3418,8 @@
         </p:nvSpPr>
         <p:spPr>
           <a:xfrm>
-            <a:off x="2728366" y="2071463"/>
-            <a:ext cx="6714083" cy="3416320"/>
+            <a:off x="2905458" y="1976213"/>
+            <a:ext cx="6368381" cy="3493264"/>
           </a:xfrm>
           <a:prstGeom prst="rect">
             <a:avLst/>
@@ -3437,25 +3437,25 @@
               <a:buChar char="•"/>
             </a:pPr>
             <a:r>
-              <a:rPr lang="en-US" dirty="0">
+              <a:rPr lang="en-US" sz="1700" dirty="0">
                 <a:latin typeface="Caslon Antique" panose="02000503000000000000" pitchFamily="2" charset="0"/>
               </a:rPr>
               <a:t>You can have up until </a:t>
             </a:r>
             <a:r>
-              <a:rPr lang="en-US" u="sng" dirty="0">
+              <a:rPr lang="en-US" sz="1700" u="sng" dirty="0">
                 <a:latin typeface="Caslon Antique" panose="02000503000000000000" pitchFamily="2" charset="0"/>
               </a:rPr>
               <a:t>6 Allys</a:t>
             </a:r>
             <a:r>
-              <a:rPr lang="en-US" dirty="0">
+              <a:rPr lang="en-US" sz="1700" dirty="0">
                 <a:latin typeface="Caslon Antique" panose="02000503000000000000" pitchFamily="2" charset="0"/>
               </a:rPr>
               <a:t> in your team </a:t>
             </a:r>
             <a:r>
-              <a:rPr lang="en-US" b="1" dirty="0">
+              <a:rPr lang="en-US" sz="1700" b="1" dirty="0">
                 <a:latin typeface="Caslon Antique" panose="02000503000000000000" pitchFamily="2" charset="0"/>
               </a:rPr>
               <a:t>at a time</a:t>
@@ -3467,73 +3467,103 @@
               <a:buChar char="•"/>
             </a:pPr>
             <a:r>
-              <a:rPr lang="en-US" dirty="0">
-                <a:latin typeface="Caslon Antique" panose="02000503000000000000" pitchFamily="2" charset="0"/>
-              </a:rPr>
-              <a:t>Pokémon count as </a:t>
-            </a:r>
-            <a:r>
-              <a:rPr lang="en-US" b="1" dirty="0">
+              <a:rPr lang="en-US" sz="1700" u="sng" dirty="0">
+                <a:latin typeface="Caslon Antique" panose="02000503000000000000" pitchFamily="2" charset="0"/>
+              </a:rPr>
+              <a:t>Stage 1</a:t>
+            </a:r>
+            <a:r>
+              <a:rPr lang="en-US" sz="1700" dirty="0">
+                <a:latin typeface="Caslon Antique" panose="02000503000000000000" pitchFamily="2" charset="0"/>
+              </a:rPr>
+              <a:t> and </a:t>
+            </a:r>
+            <a:r>
+              <a:rPr lang="en-US" sz="1700" u="sng" dirty="0">
+                <a:latin typeface="Caslon Antique" panose="02000503000000000000" pitchFamily="2" charset="0"/>
+              </a:rPr>
+              <a:t>Stage 2</a:t>
+            </a:r>
+            <a:r>
+              <a:rPr lang="en-US" sz="1700" dirty="0">
+                <a:latin typeface="Caslon Antique" panose="02000503000000000000" pitchFamily="2" charset="0"/>
+              </a:rPr>
+              <a:t>, Pokémon count as </a:t>
+            </a:r>
+            <a:r>
+              <a:rPr lang="en-US" sz="1700" b="1" dirty="0">
                 <a:latin typeface="Caslon Antique" panose="02000503000000000000" pitchFamily="2" charset="0"/>
               </a:rPr>
               <a:t>items</a:t>
             </a:r>
             <a:r>
-              <a:rPr lang="en-US" dirty="0">
+              <a:rPr lang="en-US" sz="1700" dirty="0">
                 <a:latin typeface="Caslon Antique" panose="02000503000000000000" pitchFamily="2" charset="0"/>
               </a:rPr>
               <a:t>. </a:t>
             </a:r>
             <a:r>
-              <a:rPr lang="en-US" u="sng" dirty="0">
+              <a:rPr lang="en-US" sz="1700" u="sng" dirty="0">
                 <a:latin typeface="Caslon Antique" panose="02000503000000000000" pitchFamily="2" charset="0"/>
               </a:rPr>
               <a:t>Stage 3</a:t>
             </a:r>
             <a:r>
-              <a:rPr lang="en-US" dirty="0">
+              <a:rPr lang="en-US" sz="1700" dirty="0">
                 <a:latin typeface="Caslon Antique" panose="02000503000000000000" pitchFamily="2" charset="0"/>
               </a:rPr>
               <a:t>, </a:t>
             </a:r>
             <a:r>
-              <a:rPr lang="en-US" u="sng" dirty="0">
+              <a:rPr lang="en-US" sz="1700" u="sng" dirty="0">
                 <a:latin typeface="Caslon Antique" panose="02000503000000000000" pitchFamily="2" charset="0"/>
               </a:rPr>
               <a:t>Pseudo-Legendary</a:t>
             </a:r>
             <a:r>
-              <a:rPr lang="en-US" dirty="0">
+              <a:rPr lang="en-US" sz="1700" dirty="0">
                 <a:latin typeface="Caslon Antique" panose="02000503000000000000" pitchFamily="2" charset="0"/>
               </a:rPr>
               <a:t>, </a:t>
             </a:r>
             <a:r>
-              <a:rPr lang="en-US" u="sng" dirty="0">
+              <a:rPr lang="en-US" sz="1700" u="sng" dirty="0">
                 <a:latin typeface="Caslon Antique" panose="02000503000000000000" pitchFamily="2" charset="0"/>
               </a:rPr>
               <a:t>Legendary</a:t>
             </a:r>
             <a:r>
-              <a:rPr lang="en-US" dirty="0">
+              <a:rPr lang="en-US" sz="1700" dirty="0">
+                <a:latin typeface="Caslon Antique" panose="02000503000000000000" pitchFamily="2" charset="0"/>
+              </a:rPr>
+              <a:t>, </a:t>
+            </a:r>
+            <a:r>
+              <a:rPr lang="en-US" sz="1700" u="sng" dirty="0">
+                <a:latin typeface="Caslon Antique" panose="02000503000000000000" pitchFamily="2" charset="0"/>
+              </a:rPr>
+              <a:t>Mythical</a:t>
+            </a:r>
+            <a:r>
+              <a:rPr lang="en-US" sz="1700" dirty="0">
                 <a:latin typeface="Caslon Antique" panose="02000503000000000000" pitchFamily="2" charset="0"/>
               </a:rPr>
               <a:t> and </a:t>
             </a:r>
             <a:r>
-              <a:rPr lang="en-US" u="sng" dirty="0">
-                <a:latin typeface="Caslon Antique" panose="02000503000000000000" pitchFamily="2" charset="0"/>
-              </a:rPr>
-              <a:t>Mythical</a:t>
-            </a:r>
-            <a:r>
-              <a:rPr lang="en-US" dirty="0">
+              <a:rPr lang="en-US" sz="1700" u="sng" dirty="0">
+                <a:latin typeface="Caslon Antique" panose="02000503000000000000" pitchFamily="2" charset="0"/>
+              </a:rPr>
+              <a:t>Fossil</a:t>
+            </a:r>
+            <a:r>
+              <a:rPr lang="en-US" sz="1700" dirty="0">
                 <a:latin typeface="Caslon Antique" panose="02000503000000000000" pitchFamily="2" charset="0"/>
               </a:rPr>
               <a:t> Pokémon count as </a:t>
             </a:r>
             <a:r>
-              <a:rPr lang="en-US" b="1" dirty="0">
+              <a:rPr lang="en-US" sz="1700" b="1" dirty="0">
                 <a:latin typeface="Caslon Antique" panose="02000503000000000000" pitchFamily="2" charset="0"/>
               </a:rPr>
               <a:t>big items</a:t>
@@ -3545,43 +3575,43 @@
               <a:buChar char="•"/>
             </a:pPr>
             <a:r>
-              <a:rPr lang="en-US" dirty="0">
+              <a:rPr lang="en-US" sz="1700" dirty="0">
                 <a:latin typeface="Caslon Antique" panose="02000503000000000000" pitchFamily="2" charset="0"/>
               </a:rPr>
               <a:t>Each ability can be used </a:t>
             </a:r>
             <a:r>
-              <a:rPr lang="en-US" b="1" dirty="0">
+              <a:rPr lang="en-US" sz="1700" b="1" dirty="0">
                 <a:latin typeface="Caslon Antique" panose="02000503000000000000" pitchFamily="2" charset="0"/>
               </a:rPr>
               <a:t>only once in a round</a:t>
             </a:r>
             <a:r>
-              <a:rPr lang="en-US" dirty="0">
+              <a:rPr lang="en-US" sz="1700" dirty="0">
                 <a:latin typeface="Caslon Antique" panose="02000503000000000000" pitchFamily="2" charset="0"/>
               </a:rPr>
               <a:t>, unless it’s a </a:t>
             </a:r>
             <a:r>
-              <a:rPr lang="en-US" b="1" dirty="0">
+              <a:rPr lang="en-US" sz="1700" b="1" dirty="0">
                 <a:latin typeface="Caslon Antique" panose="02000503000000000000" pitchFamily="2" charset="0"/>
               </a:rPr>
               <a:t>passive</a:t>
             </a:r>
             <a:r>
-              <a:rPr lang="en-US" dirty="0">
+              <a:rPr lang="en-US" sz="1700" dirty="0">
                 <a:latin typeface="Caslon Antique" panose="02000503000000000000" pitchFamily="2" charset="0"/>
               </a:rPr>
               <a:t> ability or a </a:t>
             </a:r>
             <a:r>
-              <a:rPr lang="en-US" b="1" dirty="0">
+              <a:rPr lang="en-US" sz="1700" b="1" dirty="0">
                 <a:latin typeface="Caslon Antique" panose="02000503000000000000" pitchFamily="2" charset="0"/>
               </a:rPr>
               <a:t>once per game </a:t>
             </a:r>
             <a:r>
-              <a:rPr lang="en-US" dirty="0">
+              <a:rPr lang="en-US" sz="1700" dirty="0">
                 <a:latin typeface="Caslon Antique" panose="02000503000000000000" pitchFamily="2" charset="0"/>
               </a:rPr>
               <a:t>ability (or else)</a:t>
@@ -3593,28 +3623,34 @@
               <a:buChar char="•"/>
             </a:pPr>
             <a:r>
-              <a:rPr lang="en-US" b="1" dirty="0">
+              <a:rPr lang="en-US" sz="1700" b="1" dirty="0">
                 <a:latin typeface="Caslon Antique" panose="02000503000000000000" pitchFamily="2" charset="0"/>
               </a:rPr>
               <a:t>Once per game </a:t>
             </a:r>
             <a:r>
-              <a:rPr lang="en-US" dirty="0">
+              <a:rPr lang="en-US" sz="1700" dirty="0">
                 <a:latin typeface="Caslon Antique" panose="02000503000000000000" pitchFamily="2" charset="0"/>
               </a:rPr>
               <a:t>abilities can be recharged by </a:t>
             </a:r>
             <a:r>
-              <a:rPr lang="en-US" b="1" dirty="0">
-                <a:latin typeface="Caslon Antique" panose="02000503000000000000" pitchFamily="2" charset="0"/>
-              </a:rPr>
-              <a:t>rolling a 1d20 </a:t>
-            </a:r>
-            <a:r>
-              <a:rPr lang="en-US" dirty="0">
-                <a:latin typeface="Caslon Antique" panose="02000503000000000000" pitchFamily="2" charset="0"/>
-              </a:rPr>
-              <a:t>and landing 18+</a:t>
+              <a:rPr lang="en-US" sz="1700" b="1" dirty="0">
+                <a:latin typeface="Caslon Antique" panose="02000503000000000000" pitchFamily="2" charset="0"/>
+              </a:rPr>
+              <a:t>winning </a:t>
+            </a:r>
+            <a:r>
+              <a:rPr lang="en-US" sz="1700" dirty="0">
+                <a:latin typeface="Caslon Antique" panose="02000503000000000000" pitchFamily="2" charset="0"/>
+              </a:rPr>
+              <a:t>in a battle against a monster with </a:t>
+            </a:r>
+            <a:r>
+              <a:rPr lang="en-US" sz="1700" u="sng" dirty="0">
+                <a:latin typeface="Caslon Antique" panose="02000503000000000000" pitchFamily="2" charset="0"/>
+              </a:rPr>
+              <a:t>bonuses of 20+</a:t>
             </a:r>
           </a:p>
           <a:p>
@@ -3623,61 +3659,61 @@
               <a:buChar char="•"/>
             </a:pPr>
             <a:r>
-              <a:rPr lang="en-US" u="sng" dirty="0">
+              <a:rPr lang="en-US" sz="1700" u="sng" dirty="0">
                 <a:latin typeface="Caslon Antique" panose="02000503000000000000" pitchFamily="2" charset="0"/>
               </a:rPr>
               <a:t>Evolution</a:t>
             </a:r>
             <a:r>
-              <a:rPr lang="en-US" dirty="0">
+              <a:rPr lang="en-US" sz="1700" dirty="0">
                 <a:latin typeface="Caslon Antique" panose="02000503000000000000" pitchFamily="2" charset="0"/>
               </a:rPr>
               <a:t> can be achieved by </a:t>
             </a:r>
             <a:r>
-              <a:rPr lang="en-US" b="1" dirty="0">
+              <a:rPr lang="en-US" sz="1700" b="1" dirty="0">
                 <a:latin typeface="Caslon Antique" panose="02000503000000000000" pitchFamily="2" charset="0"/>
               </a:rPr>
               <a:t>defeating a monster</a:t>
             </a:r>
             <a:r>
-              <a:rPr lang="en-US" dirty="0">
+              <a:rPr lang="en-US" sz="1700" dirty="0">
                 <a:latin typeface="Caslon Antique" panose="02000503000000000000" pitchFamily="2" charset="0"/>
               </a:rPr>
               <a:t>, </a:t>
             </a:r>
             <a:r>
-              <a:rPr lang="en-US" b="1" dirty="0">
+              <a:rPr lang="en-US" sz="1700" b="1" dirty="0">
                 <a:latin typeface="Caslon Antique" panose="02000503000000000000" pitchFamily="2" charset="0"/>
               </a:rPr>
               <a:t>rolling a 1d20 </a:t>
             </a:r>
             <a:r>
-              <a:rPr lang="en-US" dirty="0">
+              <a:rPr lang="en-US" sz="1700" dirty="0">
                 <a:latin typeface="Caslon Antique" panose="02000503000000000000" pitchFamily="2" charset="0"/>
               </a:rPr>
               <a:t>and landing </a:t>
             </a:r>
             <a:r>
-              <a:rPr lang="en-US" b="1" dirty="0">
+              <a:rPr lang="en-US" sz="1700" b="1" dirty="0">
                 <a:latin typeface="Caslon Antique" panose="02000503000000000000" pitchFamily="2" charset="0"/>
               </a:rPr>
               <a:t>(20 - &lt;</a:t>
             </a:r>
             <a:r>
-              <a:rPr lang="en-US" b="1" dirty="0" err="1">
+              <a:rPr lang="en-US" sz="1700" b="1" dirty="0" err="1">
                 <a:latin typeface="Caslon Antique" panose="02000503000000000000" pitchFamily="2" charset="0"/>
               </a:rPr>
               <a:t>monster_level</a:t>
             </a:r>
             <a:r>
-              <a:rPr lang="en-US" b="1" dirty="0">
+              <a:rPr lang="en-US" sz="1700" b="1" dirty="0">
                 <a:latin typeface="Caslon Antique" panose="02000503000000000000" pitchFamily="2" charset="0"/>
               </a:rPr>
               <a:t>&gt;)+ </a:t>
             </a:r>
             <a:r>
-              <a:rPr lang="en-US" dirty="0">
+              <a:rPr lang="en-US" sz="1700" dirty="0">
                 <a:latin typeface="Caslon Antique" panose="02000503000000000000" pitchFamily="2" charset="0"/>
               </a:rPr>
               <a:t>[Can’t roll on help]</a:t>
@@ -3689,13 +3725,13 @@
               <a:buChar char="•"/>
             </a:pPr>
             <a:r>
-              <a:rPr lang="en-US" dirty="0">
+              <a:rPr lang="en-US" sz="1700" dirty="0">
                 <a:latin typeface="Caslon Antique" panose="02000503000000000000" pitchFamily="2" charset="0"/>
               </a:rPr>
               <a:t>Pokémon can be </a:t>
             </a:r>
             <a:r>
-              <a:rPr lang="en-US" b="1" dirty="0">
+              <a:rPr lang="en-US" sz="1700" b="1" dirty="0">
                 <a:latin typeface="Caslon Antique" panose="02000503000000000000" pitchFamily="2" charset="0"/>
               </a:rPr>
               <a:t>traded</a:t>
@@ -3707,79 +3743,79 @@
               <a:buChar char="•"/>
             </a:pPr>
             <a:r>
-              <a:rPr lang="en-US" dirty="0">
+              <a:rPr lang="en-US" sz="1700" dirty="0">
                 <a:latin typeface="Caslon Antique" panose="02000503000000000000" pitchFamily="2" charset="0"/>
               </a:rPr>
               <a:t>You can </a:t>
             </a:r>
             <a:r>
-              <a:rPr lang="en-US" b="1" dirty="0">
+              <a:rPr lang="en-US" sz="1700" b="1" dirty="0">
                 <a:latin typeface="Caslon Antique" panose="02000503000000000000" pitchFamily="2" charset="0"/>
               </a:rPr>
               <a:t>draw a Pokémon </a:t>
             </a:r>
             <a:r>
-              <a:rPr lang="en-US" dirty="0">
+              <a:rPr lang="en-US" sz="1700" dirty="0">
                 <a:latin typeface="Caslon Antique" panose="02000503000000000000" pitchFamily="2" charset="0"/>
               </a:rPr>
               <a:t>by </a:t>
             </a:r>
             <a:r>
-              <a:rPr lang="en-US" b="1" dirty="0">
+              <a:rPr lang="en-US" sz="1700" b="1" dirty="0">
                 <a:latin typeface="Caslon Antique" panose="02000503000000000000" pitchFamily="2" charset="0"/>
               </a:rPr>
               <a:t>winning</a:t>
             </a:r>
             <a:r>
-              <a:rPr lang="en-US" dirty="0">
+              <a:rPr lang="en-US" sz="1700" dirty="0">
                 <a:latin typeface="Caslon Antique" panose="02000503000000000000" pitchFamily="2" charset="0"/>
               </a:rPr>
               <a:t> against a monster of </a:t>
             </a:r>
             <a:r>
-              <a:rPr lang="en-US" b="1" dirty="0">
+              <a:rPr lang="en-US" sz="1700" b="1" dirty="0">
                 <a:latin typeface="Caslon Antique" panose="02000503000000000000" pitchFamily="2" charset="0"/>
               </a:rPr>
               <a:t>2+ treasures </a:t>
             </a:r>
             <a:r>
-              <a:rPr lang="en-US" dirty="0">
+              <a:rPr lang="en-US" sz="1700" dirty="0">
                 <a:latin typeface="Caslon Antique" panose="02000503000000000000" pitchFamily="2" charset="0"/>
               </a:rPr>
               <a:t>and drawing a Pokémon </a:t>
             </a:r>
             <a:r>
-              <a:rPr lang="en-US" u="sng" dirty="0">
+              <a:rPr lang="en-US" sz="1700" u="sng" dirty="0">
                 <a:latin typeface="Caslon Antique" panose="02000503000000000000" pitchFamily="2" charset="0"/>
               </a:rPr>
               <a:t>instead</a:t>
             </a:r>
             <a:r>
-              <a:rPr lang="en-US" dirty="0">
+              <a:rPr lang="en-US" sz="1700" dirty="0">
                 <a:latin typeface="Caslon Antique" panose="02000503000000000000" pitchFamily="2" charset="0"/>
               </a:rPr>
               <a:t> of the treasures. If you have </a:t>
             </a:r>
             <a:r>
-              <a:rPr lang="en-US" b="1" dirty="0">
+              <a:rPr lang="en-US" sz="1700" b="1" dirty="0">
                 <a:latin typeface="Caslon Antique" panose="02000503000000000000" pitchFamily="2" charset="0"/>
               </a:rPr>
               <a:t>0 Pokémon</a:t>
             </a:r>
             <a:r>
-              <a:rPr lang="en-US" dirty="0">
+              <a:rPr lang="en-US" sz="1700" dirty="0">
                 <a:latin typeface="Caslon Antique" panose="02000503000000000000" pitchFamily="2" charset="0"/>
               </a:rPr>
               <a:t>, you can exchange </a:t>
             </a:r>
             <a:r>
-              <a:rPr lang="en-US" u="sng" dirty="0">
+              <a:rPr lang="en-US" sz="1700" u="sng" dirty="0">
                 <a:latin typeface="Caslon Antique" panose="02000503000000000000" pitchFamily="2" charset="0"/>
               </a:rPr>
               <a:t>1 treasure</a:t>
             </a:r>
             <a:r>
-              <a:rPr lang="en-US" dirty="0">
+              <a:rPr lang="en-US" sz="1700" dirty="0">
                 <a:latin typeface="Caslon Antique" panose="02000503000000000000" pitchFamily="2" charset="0"/>
               </a:rPr>
               <a:t> when winning a fight instead of the usual 2</a:t>

</xml_diff>

<commit_message>
Added a player mat
</commit_message>
<xml_diff>
--- a/external/pokemon_munchkin_rules.pptx
+++ b/external/pokemon_munchkin_rules.pptx
@@ -3349,7 +3349,7 @@
         </p:blipFill>
         <p:spPr>
           <a:xfrm rot="5400000">
-            <a:off x="3772337" y="-244775"/>
+            <a:off x="1350112" y="-1359348"/>
             <a:ext cx="4647325" cy="7347549"/>
           </a:xfrm>
           <a:prstGeom prst="rect">
@@ -3371,7 +3371,7 @@
         </p:nvSpPr>
         <p:spPr>
           <a:xfrm>
-            <a:off x="2635249" y="1514548"/>
+            <a:off x="213024" y="399975"/>
             <a:ext cx="6908801" cy="461665"/>
           </a:xfrm>
           <a:prstGeom prst="rect">
@@ -3418,7 +3418,7 @@
         </p:nvSpPr>
         <p:spPr>
           <a:xfrm>
-            <a:off x="2905458" y="1976213"/>
+            <a:off x="483233" y="861640"/>
             <a:ext cx="6368381" cy="3493264"/>
           </a:xfrm>
           <a:prstGeom prst="rect">
@@ -3614,7 +3614,7 @@
               <a:rPr lang="en-US" sz="1700" dirty="0">
                 <a:latin typeface="Caslon Antique" panose="02000503000000000000" pitchFamily="2" charset="0"/>
               </a:rPr>
-              <a:t>ability (or else)</a:t>
+              <a:t>ability (or else)	</a:t>
             </a:r>
           </a:p>
           <a:p>
@@ -3851,7 +3851,7 @@
         </p:blipFill>
         <p:spPr>
           <a:xfrm>
-            <a:off x="8591112" y="1212849"/>
+            <a:off x="6168887" y="98276"/>
             <a:ext cx="1016437" cy="1016437"/>
           </a:xfrm>
           <a:prstGeom prst="rect">

</xml_diff>